<commit_message>
Remove bottom logo on slide 7
</commit_message>
<xml_diff>
--- a/Deliverables/sprint-13/presentation-slides.pptx
+++ b/Deliverables/sprint-13/presentation-slides.pptx
@@ -823,7 +823,7 @@
   <p:cSld>
     <p:spTree>
       <p:nvGrpSpPr>
-        <p:cNvPr id="162" name="Shape 162"/>
+        <p:cNvPr id="161" name="Shape 161"/>
         <p:cNvGrpSpPr/>
         <p:nvPr/>
       </p:nvGrpSpPr>
@@ -837,7 +837,7 @@
       </p:grpSpPr>
       <p:sp>
         <p:nvSpPr>
-          <p:cNvPr id="163" name="Google Shape;163;g2b4a3c131d9_3_20:notes"/>
+          <p:cNvPr id="162" name="Google Shape;162;g2b4a3c131d9_3_20:notes"/>
           <p:cNvSpPr/>
           <p:nvPr>
             <p:ph idx="2" type="sldImg"/>
@@ -872,7 +872,7 @@
       </p:sp>
       <p:sp>
         <p:nvSpPr>
-          <p:cNvPr id="164" name="Google Shape;164;g2b4a3c131d9_3_20:notes"/>
+          <p:cNvPr id="163" name="Google Shape;163;g2b4a3c131d9_3_20:notes"/>
           <p:cNvSpPr txBox="1"/>
           <p:nvPr>
             <p:ph idx="1" type="body"/>
@@ -1837,7 +1837,7 @@
   <p:cSld>
     <p:spTree>
       <p:nvGrpSpPr>
-        <p:cNvPr id="146" name="Shape 146"/>
+        <p:cNvPr id="145" name="Shape 145"/>
         <p:cNvGrpSpPr/>
         <p:nvPr/>
       </p:nvGrpSpPr>
@@ -1851,7 +1851,7 @@
       </p:grpSpPr>
       <p:sp>
         <p:nvSpPr>
-          <p:cNvPr id="147" name="Google Shape;147;g2b1b85bf990_0_92:notes"/>
+          <p:cNvPr id="146" name="Google Shape;146;g2b1b85bf990_0_92:notes"/>
           <p:cNvSpPr/>
           <p:nvPr>
             <p:ph idx="2" type="sldImg"/>
@@ -1886,7 +1886,7 @@
       </p:sp>
       <p:sp>
         <p:nvSpPr>
-          <p:cNvPr id="148" name="Google Shape;148;g2b1b85bf990_0_92:notes"/>
+          <p:cNvPr id="147" name="Google Shape;147;g2b1b85bf990_0_92:notes"/>
           <p:cNvSpPr txBox="1"/>
           <p:nvPr>
             <p:ph idx="1" type="body"/>
@@ -2031,7 +2031,7 @@
   <p:cSld>
     <p:spTree>
       <p:nvGrpSpPr>
-        <p:cNvPr id="157" name="Shape 157"/>
+        <p:cNvPr id="156" name="Shape 156"/>
         <p:cNvGrpSpPr/>
         <p:nvPr/>
       </p:nvGrpSpPr>
@@ -2045,7 +2045,7 @@
       </p:grpSpPr>
       <p:sp>
         <p:nvSpPr>
-          <p:cNvPr id="158" name="Google Shape;158;g2b1b85bf990_0_122:notes"/>
+          <p:cNvPr id="157" name="Google Shape;157;g2b1b85bf990_0_122:notes"/>
           <p:cNvSpPr/>
           <p:nvPr>
             <p:ph idx="2" type="sldImg"/>
@@ -2080,7 +2080,7 @@
       </p:sp>
       <p:sp>
         <p:nvSpPr>
-          <p:cNvPr id="159" name="Google Shape;159;g2b1b85bf990_0_122:notes"/>
+          <p:cNvPr id="158" name="Google Shape;158;g2b1b85bf990_0_122:notes"/>
           <p:cNvSpPr txBox="1"/>
           <p:nvPr>
             <p:ph idx="1" type="body"/>
@@ -7037,7 +7037,7 @@
     </p:bg>
     <p:spTree>
       <p:nvGrpSpPr>
-        <p:cNvPr id="165" name="Shape 165"/>
+        <p:cNvPr id="164" name="Shape 164"/>
         <p:cNvGrpSpPr/>
         <p:nvPr/>
       </p:nvGrpSpPr>
@@ -7051,7 +7051,7 @@
       </p:grpSpPr>
       <p:sp>
         <p:nvSpPr>
-          <p:cNvPr id="166" name="Google Shape;166;p22"/>
+          <p:cNvPr id="165" name="Google Shape;165;p22"/>
           <p:cNvSpPr/>
           <p:nvPr/>
         </p:nvSpPr>
@@ -7097,7 +7097,7 @@
       </p:sp>
       <p:sp>
         <p:nvSpPr>
-          <p:cNvPr id="167" name="Google Shape;167;p22"/>
+          <p:cNvPr id="166" name="Google Shape;166;p22"/>
           <p:cNvSpPr txBox="1"/>
           <p:nvPr>
             <p:ph type="ctrTitle"/>
@@ -7157,7 +7157,7 @@
       </p:sp>
       <p:pic>
         <p:nvPicPr>
-          <p:cNvPr id="168" name="Google Shape;168;p22"/>
+          <p:cNvPr id="167" name="Google Shape;167;p22"/>
           <p:cNvPicPr preferRelativeResize="0"/>
           <p:nvPr/>
         </p:nvPicPr>
@@ -10751,34 +10751,6 @@
           </a:p>
         </p:txBody>
       </p:sp>
-      <p:pic>
-        <p:nvPicPr>
-          <p:cNvPr id="145" name="Google Shape;145;p19"/>
-          <p:cNvPicPr preferRelativeResize="0"/>
-          <p:nvPr/>
-        </p:nvPicPr>
-        <p:blipFill>
-          <a:blip r:embed="rId3">
-            <a:alphaModFix/>
-          </a:blip>
-          <a:stretch>
-            <a:fillRect/>
-          </a:stretch>
-        </p:blipFill>
-        <p:spPr>
-          <a:xfrm>
-            <a:off x="7820304" y="4703625"/>
-            <a:ext cx="1273324" cy="381750"/>
-          </a:xfrm>
-          <a:prstGeom prst="rect">
-            <a:avLst/>
-          </a:prstGeom>
-          <a:noFill/>
-          <a:ln>
-            <a:noFill/>
-          </a:ln>
-        </p:spPr>
-      </p:pic>
     </p:spTree>
   </p:cSld>
   <p:clrMapOvr>
@@ -10801,7 +10773,7 @@
     </p:bg>
     <p:spTree>
       <p:nvGrpSpPr>
-        <p:cNvPr id="149" name="Shape 149"/>
+        <p:cNvPr id="148" name="Shape 148"/>
         <p:cNvGrpSpPr/>
         <p:nvPr/>
       </p:nvGrpSpPr>
@@ -10815,7 +10787,7 @@
       </p:grpSpPr>
       <p:sp>
         <p:nvSpPr>
-          <p:cNvPr id="150" name="Google Shape;150;p20"/>
+          <p:cNvPr id="149" name="Google Shape;149;p20"/>
           <p:cNvSpPr txBox="1"/>
           <p:nvPr>
             <p:ph type="title"/>
@@ -10895,7 +10867,7 @@
       </p:sp>
       <p:sp>
         <p:nvSpPr>
-          <p:cNvPr id="151" name="Google Shape;151;p20"/>
+          <p:cNvPr id="150" name="Google Shape;150;p20"/>
           <p:cNvSpPr txBox="1"/>
           <p:nvPr>
             <p:ph idx="1" type="body"/>
@@ -10975,7 +10947,7 @@
       </p:sp>
       <p:pic>
         <p:nvPicPr>
-          <p:cNvPr id="152" name="Google Shape;152;p20"/>
+          <p:cNvPr id="151" name="Google Shape;151;p20"/>
           <p:cNvPicPr preferRelativeResize="0"/>
           <p:nvPr/>
         </p:nvPicPr>
@@ -11003,7 +10975,7 @@
       </p:pic>
       <p:pic>
         <p:nvPicPr>
-          <p:cNvPr id="153" name="Google Shape;153;p20"/>
+          <p:cNvPr id="152" name="Google Shape;152;p20"/>
           <p:cNvPicPr preferRelativeResize="0"/>
           <p:nvPr/>
         </p:nvPicPr>
@@ -11031,7 +11003,7 @@
       </p:pic>
       <p:pic>
         <p:nvPicPr>
-          <p:cNvPr id="154" name="Google Shape;154;p20"/>
+          <p:cNvPr id="153" name="Google Shape;153;p20"/>
           <p:cNvPicPr preferRelativeResize="0"/>
           <p:nvPr/>
         </p:nvPicPr>
@@ -11059,7 +11031,7 @@
       </p:pic>
       <p:sp>
         <p:nvSpPr>
-          <p:cNvPr id="155" name="Google Shape;155;p20"/>
+          <p:cNvPr id="154" name="Google Shape;154;p20"/>
           <p:cNvSpPr txBox="1"/>
           <p:nvPr/>
         </p:nvSpPr>
@@ -11117,7 +11089,7 @@
       </p:sp>
       <p:sp>
         <p:nvSpPr>
-          <p:cNvPr id="156" name="Google Shape;156;p20"/>
+          <p:cNvPr id="155" name="Google Shape;155;p20"/>
           <p:cNvSpPr txBox="1"/>
           <p:nvPr/>
         </p:nvSpPr>
@@ -11212,7 +11184,7 @@
                                           </p:stCondLst>
                                         </p:cTn>
                                         <p:tgtEl>
-                                          <p:spTgt spid="155"/>
+                                          <p:spTgt spid="154"/>
                                         </p:tgtEl>
                                         <p:attrNameLst>
                                           <p:attrName>style.visibility</p:attrName>
@@ -11226,7 +11198,7 @@
                                       <p:cBhvr additive="base">
                                         <p:cTn dur="1000"/>
                                         <p:tgtEl>
-                                          <p:spTgt spid="155"/>
+                                          <p:spTgt spid="154"/>
                                         </p:tgtEl>
                                         <p:attrNameLst>
                                           <p:attrName>ppt_w</p:attrName>
@@ -11249,7 +11221,7 @@
                                       <p:cBhvr additive="base">
                                         <p:cTn dur="1000"/>
                                         <p:tgtEl>
-                                          <p:spTgt spid="155"/>
+                                          <p:spTgt spid="154"/>
                                         </p:tgtEl>
                                         <p:attrNameLst>
                                           <p:attrName>ppt_h</p:attrName>
@@ -11285,7 +11257,7 @@
                                           </p:stCondLst>
                                         </p:cTn>
                                         <p:tgtEl>
-                                          <p:spTgt spid="153"/>
+                                          <p:spTgt spid="152"/>
                                         </p:tgtEl>
                                         <p:attrNameLst>
                                           <p:attrName>style.visibility</p:attrName>
@@ -11299,7 +11271,7 @@
                                       <p:cBhvr additive="base">
                                         <p:cTn dur="1000"/>
                                         <p:tgtEl>
-                                          <p:spTgt spid="153"/>
+                                          <p:spTgt spid="152"/>
                                         </p:tgtEl>
                                         <p:attrNameLst>
                                           <p:attrName>ppt_w</p:attrName>
@@ -11322,7 +11294,7 @@
                                       <p:cBhvr additive="base">
                                         <p:cTn dur="1000"/>
                                         <p:tgtEl>
-                                          <p:spTgt spid="153"/>
+                                          <p:spTgt spid="152"/>
                                         </p:tgtEl>
                                         <p:attrNameLst>
                                           <p:attrName>ppt_h</p:attrName>
@@ -11389,7 +11361,7 @@
     </p:bg>
     <p:spTree>
       <p:nvGrpSpPr>
-        <p:cNvPr id="160" name="Shape 160"/>
+        <p:cNvPr id="159" name="Shape 159"/>
         <p:cNvGrpSpPr/>
         <p:nvPr/>
       </p:nvGrpSpPr>
@@ -11403,7 +11375,7 @@
       </p:grpSpPr>
       <p:sp>
         <p:nvSpPr>
-          <p:cNvPr id="161" name="Google Shape;161;p21"/>
+          <p:cNvPr id="160" name="Google Shape;160;p21"/>
           <p:cNvSpPr txBox="1"/>
           <p:nvPr>
             <p:ph type="title"/>
@@ -11466,6 +11438,285 @@
 </file>
 
 <file path=ppt/theme/theme1.xml><?xml version="1.0" encoding="utf-8"?>
+<a:theme xmlns:a="http://schemas.openxmlformats.org/drawingml/2006/main" xmlns:r="http://schemas.openxmlformats.org/officeDocument/2006/relationships">
+  <a:themeElements>
+    <a:clrScheme name="Default">
+      <a:dk1>
+        <a:srgbClr val="000000"/>
+      </a:dk1>
+      <a:lt1>
+        <a:srgbClr val="FFFFFF"/>
+      </a:lt1>
+      <a:dk2>
+        <a:srgbClr val="158158"/>
+      </a:dk2>
+      <a:lt2>
+        <a:srgbClr val="F3F3F3"/>
+      </a:lt2>
+      <a:accent1>
+        <a:srgbClr val="058DC7"/>
+      </a:accent1>
+      <a:accent2>
+        <a:srgbClr val="50B432"/>
+      </a:accent2>
+      <a:accent3>
+        <a:srgbClr val="ED561B"/>
+      </a:accent3>
+      <a:accent4>
+        <a:srgbClr val="EDEF00"/>
+      </a:accent4>
+      <a:accent5>
+        <a:srgbClr val="24CBE5"/>
+      </a:accent5>
+      <a:accent6>
+        <a:srgbClr val="64E572"/>
+      </a:accent6>
+      <a:hlink>
+        <a:srgbClr val="2200CC"/>
+      </a:hlink>
+      <a:folHlink>
+        <a:srgbClr val="551A8B"/>
+      </a:folHlink>
+    </a:clrScheme>
+    <a:fontScheme name="Office">
+      <a:majorFont>
+        <a:latin typeface="Arial"/>
+        <a:ea typeface=""/>
+        <a:cs typeface=""/>
+        <a:font script="Jpan" typeface="ＭＳ Ｐゴシック"/>
+        <a:font script="Hang" typeface="맑은 고딕"/>
+        <a:font script="Hans" typeface="宋体"/>
+        <a:font script="Hant" typeface="新細明體"/>
+        <a:font script="Arab" typeface="Times New Roman"/>
+        <a:font script="Hebr" typeface="Times New Roman"/>
+        <a:font script="Thai" typeface="Angsana New"/>
+        <a:font script="Ethi" typeface="Nyala"/>
+        <a:font script="Beng" typeface="Vrinda"/>
+        <a:font script="Gujr" typeface="Shruti"/>
+        <a:font script="Khmr" typeface="MoolBoran"/>
+        <a:font script="Knda" typeface="Tunga"/>
+        <a:font script="Guru" typeface="Raavi"/>
+        <a:font script="Cans" typeface="Euphemia"/>
+        <a:font script="Cher" typeface="Plantagenet Cherokee"/>
+        <a:font script="Yiii" typeface="Microsoft Yi Baiti"/>
+        <a:font script="Tibt" typeface="Microsoft Himalaya"/>
+        <a:font script="Thaa" typeface="MV Boli"/>
+        <a:font script="Deva" typeface="Mangal"/>
+        <a:font script="Telu" typeface="Gautami"/>
+        <a:font script="Taml" typeface="Latha"/>
+        <a:font script="Syrc" typeface="Estrangelo Edessa"/>
+        <a:font script="Orya" typeface="Kalinga"/>
+        <a:font script="Mlym" typeface="Kartika"/>
+        <a:font script="Laoo" typeface="DokChampa"/>
+        <a:font script="Sinh" typeface="Iskoola Pota"/>
+        <a:font script="Mong" typeface="Mongolian Baiti"/>
+        <a:font script="Viet" typeface="Times New Roman"/>
+        <a:font script="Uigh" typeface="Microsoft Uighur"/>
+        <a:font script="Geor" typeface="Sylfaen"/>
+      </a:majorFont>
+      <a:minorFont>
+        <a:latin typeface="Arial"/>
+        <a:ea typeface=""/>
+        <a:cs typeface=""/>
+        <a:font script="Jpan" typeface="ＭＳ Ｐゴシック"/>
+        <a:font script="Hang" typeface="맑은 고딕"/>
+        <a:font script="Hans" typeface="宋体"/>
+        <a:font script="Hant" typeface="新細明體"/>
+        <a:font script="Arab" typeface="Arial"/>
+        <a:font script="Hebr" typeface="Arial"/>
+        <a:font script="Thai" typeface="Cordia New"/>
+        <a:font script="Ethi" typeface="Nyala"/>
+        <a:font script="Beng" typeface="Vrinda"/>
+        <a:font script="Gujr" typeface="Shruti"/>
+        <a:font script="Khmr" typeface="DaunPenh"/>
+        <a:font script="Knda" typeface="Tunga"/>
+        <a:font script="Guru" typeface="Raavi"/>
+        <a:font script="Cans" typeface="Euphemia"/>
+        <a:font script="Cher" typeface="Plantagenet Cherokee"/>
+        <a:font script="Yiii" typeface="Microsoft Yi Baiti"/>
+        <a:font script="Tibt" typeface="Microsoft Himalaya"/>
+        <a:font script="Thaa" typeface="MV Boli"/>
+        <a:font script="Deva" typeface="Mangal"/>
+        <a:font script="Telu" typeface="Gautami"/>
+        <a:font script="Taml" typeface="Latha"/>
+        <a:font script="Syrc" typeface="Estrangelo Edessa"/>
+        <a:font script="Orya" typeface="Kalinga"/>
+        <a:font script="Mlym" typeface="Kartika"/>
+        <a:font script="Laoo" typeface="DokChampa"/>
+        <a:font script="Sinh" typeface="Iskoola Pota"/>
+        <a:font script="Mong" typeface="Mongolian Baiti"/>
+        <a:font script="Viet" typeface="Arial"/>
+        <a:font script="Uigh" typeface="Microsoft Uighur"/>
+        <a:font script="Geor" typeface="Sylfaen"/>
+      </a:minorFont>
+    </a:fontScheme>
+    <a:fmtScheme name="Office">
+      <a:fillStyleLst>
+        <a:solidFill>
+          <a:schemeClr val="phClr"/>
+        </a:solidFill>
+        <a:gradFill rotWithShape="1">
+          <a:gsLst>
+            <a:gs pos="0">
+              <a:schemeClr val="phClr">
+                <a:tint val="50000"/>
+                <a:satMod val="300000"/>
+              </a:schemeClr>
+            </a:gs>
+            <a:gs pos="35000">
+              <a:schemeClr val="phClr">
+                <a:tint val="37000"/>
+                <a:satMod val="300000"/>
+              </a:schemeClr>
+            </a:gs>
+            <a:gs pos="100000">
+              <a:schemeClr val="phClr">
+                <a:tint val="15000"/>
+                <a:satMod val="350000"/>
+              </a:schemeClr>
+            </a:gs>
+          </a:gsLst>
+          <a:lin ang="16200000" scaled="1"/>
+        </a:gradFill>
+        <a:gradFill rotWithShape="1">
+          <a:gsLst>
+            <a:gs pos="0">
+              <a:schemeClr val="phClr">
+                <a:tint val="100000"/>
+                <a:shade val="100000"/>
+                <a:satMod val="130000"/>
+              </a:schemeClr>
+            </a:gs>
+            <a:gs pos="100000">
+              <a:schemeClr val="phClr">
+                <a:tint val="50000"/>
+                <a:shade val="100000"/>
+                <a:satMod val="350000"/>
+              </a:schemeClr>
+            </a:gs>
+          </a:gsLst>
+          <a:lin ang="16200000" scaled="0"/>
+        </a:gradFill>
+      </a:fillStyleLst>
+      <a:lnStyleLst>
+        <a:ln w="9525" cap="flat" cmpd="sng" algn="ctr">
+          <a:solidFill>
+            <a:schemeClr val="phClr">
+              <a:shade val="95000"/>
+              <a:satMod val="105000"/>
+            </a:schemeClr>
+          </a:solidFill>
+          <a:prstDash val="solid"/>
+        </a:ln>
+        <a:ln w="25400" cap="flat" cmpd="sng" algn="ctr">
+          <a:solidFill>
+            <a:schemeClr val="phClr"/>
+          </a:solidFill>
+          <a:prstDash val="solid"/>
+        </a:ln>
+        <a:ln w="38100" cap="flat" cmpd="sng" algn="ctr">
+          <a:solidFill>
+            <a:schemeClr val="phClr"/>
+          </a:solidFill>
+          <a:prstDash val="solid"/>
+        </a:ln>
+      </a:lnStyleLst>
+      <a:effectStyleLst>
+        <a:effectStyle>
+          <a:effectLst>
+            <a:outerShdw blurRad="40000" dist="20000" dir="5400000" rotWithShape="0">
+              <a:srgbClr val="000000">
+                <a:alpha val="38000"/>
+              </a:srgbClr>
+            </a:outerShdw>
+          </a:effectLst>
+        </a:effectStyle>
+        <a:effectStyle>
+          <a:effectLst>
+            <a:outerShdw blurRad="40000" dist="23000" dir="5400000" rotWithShape="0">
+              <a:srgbClr val="000000">
+                <a:alpha val="35000"/>
+              </a:srgbClr>
+            </a:outerShdw>
+          </a:effectLst>
+        </a:effectStyle>
+        <a:effectStyle>
+          <a:effectLst>
+            <a:outerShdw blurRad="40000" dist="23000" dir="5400000" rotWithShape="0">
+              <a:srgbClr val="000000">
+                <a:alpha val="35000"/>
+              </a:srgbClr>
+            </a:outerShdw>
+          </a:effectLst>
+          <a:scene3d>
+            <a:camera prst="orthographicFront">
+              <a:rot lat="0" lon="0" rev="0"/>
+            </a:camera>
+            <a:lightRig rig="threePt" dir="t">
+              <a:rot lat="0" lon="0" rev="1200000"/>
+            </a:lightRig>
+          </a:scene3d>
+          <a:sp3d>
+            <a:bevelT w="63500" h="25400"/>
+          </a:sp3d>
+        </a:effectStyle>
+      </a:effectStyleLst>
+      <a:bgFillStyleLst>
+        <a:solidFill>
+          <a:schemeClr val="phClr"/>
+        </a:solidFill>
+        <a:gradFill rotWithShape="1">
+          <a:gsLst>
+            <a:gs pos="0">
+              <a:schemeClr val="phClr">
+                <a:tint val="40000"/>
+                <a:satMod val="350000"/>
+              </a:schemeClr>
+            </a:gs>
+            <a:gs pos="40000">
+              <a:schemeClr val="phClr">
+                <a:tint val="45000"/>
+                <a:shade val="99000"/>
+                <a:satMod val="350000"/>
+              </a:schemeClr>
+            </a:gs>
+            <a:gs pos="100000">
+              <a:schemeClr val="phClr">
+                <a:shade val="20000"/>
+                <a:satMod val="255000"/>
+              </a:schemeClr>
+            </a:gs>
+          </a:gsLst>
+          <a:path path="circle">
+            <a:fillToRect l="50000" t="-80000" r="50000" b="180000"/>
+          </a:path>
+        </a:gradFill>
+        <a:gradFill rotWithShape="1">
+          <a:gsLst>
+            <a:gs pos="0">
+              <a:schemeClr val="phClr">
+                <a:tint val="80000"/>
+                <a:satMod val="300000"/>
+              </a:schemeClr>
+            </a:gs>
+            <a:gs pos="100000">
+              <a:schemeClr val="phClr">
+                <a:shade val="30000"/>
+                <a:satMod val="200000"/>
+              </a:schemeClr>
+            </a:gs>
+          </a:gsLst>
+          <a:path path="circle">
+            <a:fillToRect l="50000" t="50000" r="50000" b="50000"/>
+          </a:path>
+        </a:gradFill>
+      </a:bgFillStyleLst>
+    </a:fmtScheme>
+  </a:themeElements>
+</a:theme>
+</file>
+
+<file path=ppt/theme/theme2.xml><?xml version="1.0" encoding="utf-8"?>
 <a:theme xmlns:a="http://schemas.openxmlformats.org/drawingml/2006/main" xmlns:r="http://schemas.openxmlformats.org/officeDocument/2006/relationships" name="Simple Light">
   <a:themeElements>
     <a:clrScheme name="Simple Light">
@@ -11742,283 +11993,4 @@
     </a:fmtScheme>
   </a:themeElements>
 </a:theme>
-</file>
-
-<file path=ppt/theme/theme2.xml><?xml version="1.0" encoding="utf-8"?>
-<a:theme xmlns:a="http://schemas.openxmlformats.org/drawingml/2006/main" xmlns:r="http://schemas.openxmlformats.org/officeDocument/2006/relationships">
-  <a:themeElements>
-    <a:clrScheme name="Default">
-      <a:dk1>
-        <a:srgbClr val="000000"/>
-      </a:dk1>
-      <a:lt1>
-        <a:srgbClr val="FFFFFF"/>
-      </a:lt1>
-      <a:dk2>
-        <a:srgbClr val="158158"/>
-      </a:dk2>
-      <a:lt2>
-        <a:srgbClr val="F3F3F3"/>
-      </a:lt2>
-      <a:accent1>
-        <a:srgbClr val="058DC7"/>
-      </a:accent1>
-      <a:accent2>
-        <a:srgbClr val="50B432"/>
-      </a:accent2>
-      <a:accent3>
-        <a:srgbClr val="ED561B"/>
-      </a:accent3>
-      <a:accent4>
-        <a:srgbClr val="EDEF00"/>
-      </a:accent4>
-      <a:accent5>
-        <a:srgbClr val="24CBE5"/>
-      </a:accent5>
-      <a:accent6>
-        <a:srgbClr val="64E572"/>
-      </a:accent6>
-      <a:hlink>
-        <a:srgbClr val="2200CC"/>
-      </a:hlink>
-      <a:folHlink>
-        <a:srgbClr val="551A8B"/>
-      </a:folHlink>
-    </a:clrScheme>
-    <a:fontScheme name="Office">
-      <a:majorFont>
-        <a:latin typeface="Arial"/>
-        <a:ea typeface=""/>
-        <a:cs typeface=""/>
-        <a:font script="Jpan" typeface="ＭＳ Ｐゴシック"/>
-        <a:font script="Hang" typeface="맑은 고딕"/>
-        <a:font script="Hans" typeface="宋体"/>
-        <a:font script="Hant" typeface="新細明體"/>
-        <a:font script="Arab" typeface="Times New Roman"/>
-        <a:font script="Hebr" typeface="Times New Roman"/>
-        <a:font script="Thai" typeface="Angsana New"/>
-        <a:font script="Ethi" typeface="Nyala"/>
-        <a:font script="Beng" typeface="Vrinda"/>
-        <a:font script="Gujr" typeface="Shruti"/>
-        <a:font script="Khmr" typeface="MoolBoran"/>
-        <a:font script="Knda" typeface="Tunga"/>
-        <a:font script="Guru" typeface="Raavi"/>
-        <a:font script="Cans" typeface="Euphemia"/>
-        <a:font script="Cher" typeface="Plantagenet Cherokee"/>
-        <a:font script="Yiii" typeface="Microsoft Yi Baiti"/>
-        <a:font script="Tibt" typeface="Microsoft Himalaya"/>
-        <a:font script="Thaa" typeface="MV Boli"/>
-        <a:font script="Deva" typeface="Mangal"/>
-        <a:font script="Telu" typeface="Gautami"/>
-        <a:font script="Taml" typeface="Latha"/>
-        <a:font script="Syrc" typeface="Estrangelo Edessa"/>
-        <a:font script="Orya" typeface="Kalinga"/>
-        <a:font script="Mlym" typeface="Kartika"/>
-        <a:font script="Laoo" typeface="DokChampa"/>
-        <a:font script="Sinh" typeface="Iskoola Pota"/>
-        <a:font script="Mong" typeface="Mongolian Baiti"/>
-        <a:font script="Viet" typeface="Times New Roman"/>
-        <a:font script="Uigh" typeface="Microsoft Uighur"/>
-        <a:font script="Geor" typeface="Sylfaen"/>
-      </a:majorFont>
-      <a:minorFont>
-        <a:latin typeface="Arial"/>
-        <a:ea typeface=""/>
-        <a:cs typeface=""/>
-        <a:font script="Jpan" typeface="ＭＳ Ｐゴシック"/>
-        <a:font script="Hang" typeface="맑은 고딕"/>
-        <a:font script="Hans" typeface="宋体"/>
-        <a:font script="Hant" typeface="新細明體"/>
-        <a:font script="Arab" typeface="Arial"/>
-        <a:font script="Hebr" typeface="Arial"/>
-        <a:font script="Thai" typeface="Cordia New"/>
-        <a:font script="Ethi" typeface="Nyala"/>
-        <a:font script="Beng" typeface="Vrinda"/>
-        <a:font script="Gujr" typeface="Shruti"/>
-        <a:font script="Khmr" typeface="DaunPenh"/>
-        <a:font script="Knda" typeface="Tunga"/>
-        <a:font script="Guru" typeface="Raavi"/>
-        <a:font script="Cans" typeface="Euphemia"/>
-        <a:font script="Cher" typeface="Plantagenet Cherokee"/>
-        <a:font script="Yiii" typeface="Microsoft Yi Baiti"/>
-        <a:font script="Tibt" typeface="Microsoft Himalaya"/>
-        <a:font script="Thaa" typeface="MV Boli"/>
-        <a:font script="Deva" typeface="Mangal"/>
-        <a:font script="Telu" typeface="Gautami"/>
-        <a:font script="Taml" typeface="Latha"/>
-        <a:font script="Syrc" typeface="Estrangelo Edessa"/>
-        <a:font script="Orya" typeface="Kalinga"/>
-        <a:font script="Mlym" typeface="Kartika"/>
-        <a:font script="Laoo" typeface="DokChampa"/>
-        <a:font script="Sinh" typeface="Iskoola Pota"/>
-        <a:font script="Mong" typeface="Mongolian Baiti"/>
-        <a:font script="Viet" typeface="Arial"/>
-        <a:font script="Uigh" typeface="Microsoft Uighur"/>
-        <a:font script="Geor" typeface="Sylfaen"/>
-      </a:minorFont>
-    </a:fontScheme>
-    <a:fmtScheme name="Office">
-      <a:fillStyleLst>
-        <a:solidFill>
-          <a:schemeClr val="phClr"/>
-        </a:solidFill>
-        <a:gradFill rotWithShape="1">
-          <a:gsLst>
-            <a:gs pos="0">
-              <a:schemeClr val="phClr">
-                <a:tint val="50000"/>
-                <a:satMod val="300000"/>
-              </a:schemeClr>
-            </a:gs>
-            <a:gs pos="35000">
-              <a:schemeClr val="phClr">
-                <a:tint val="37000"/>
-                <a:satMod val="300000"/>
-              </a:schemeClr>
-            </a:gs>
-            <a:gs pos="100000">
-              <a:schemeClr val="phClr">
-                <a:tint val="15000"/>
-                <a:satMod val="350000"/>
-              </a:schemeClr>
-            </a:gs>
-          </a:gsLst>
-          <a:lin ang="16200000" scaled="1"/>
-        </a:gradFill>
-        <a:gradFill rotWithShape="1">
-          <a:gsLst>
-            <a:gs pos="0">
-              <a:schemeClr val="phClr">
-                <a:tint val="100000"/>
-                <a:shade val="100000"/>
-                <a:satMod val="130000"/>
-              </a:schemeClr>
-            </a:gs>
-            <a:gs pos="100000">
-              <a:schemeClr val="phClr">
-                <a:tint val="50000"/>
-                <a:shade val="100000"/>
-                <a:satMod val="350000"/>
-              </a:schemeClr>
-            </a:gs>
-          </a:gsLst>
-          <a:lin ang="16200000" scaled="0"/>
-        </a:gradFill>
-      </a:fillStyleLst>
-      <a:lnStyleLst>
-        <a:ln w="9525" cap="flat" cmpd="sng" algn="ctr">
-          <a:solidFill>
-            <a:schemeClr val="phClr">
-              <a:shade val="95000"/>
-              <a:satMod val="105000"/>
-            </a:schemeClr>
-          </a:solidFill>
-          <a:prstDash val="solid"/>
-        </a:ln>
-        <a:ln w="25400" cap="flat" cmpd="sng" algn="ctr">
-          <a:solidFill>
-            <a:schemeClr val="phClr"/>
-          </a:solidFill>
-          <a:prstDash val="solid"/>
-        </a:ln>
-        <a:ln w="38100" cap="flat" cmpd="sng" algn="ctr">
-          <a:solidFill>
-            <a:schemeClr val="phClr"/>
-          </a:solidFill>
-          <a:prstDash val="solid"/>
-        </a:ln>
-      </a:lnStyleLst>
-      <a:effectStyleLst>
-        <a:effectStyle>
-          <a:effectLst>
-            <a:outerShdw blurRad="40000" dist="20000" dir="5400000" rotWithShape="0">
-              <a:srgbClr val="000000">
-                <a:alpha val="38000"/>
-              </a:srgbClr>
-            </a:outerShdw>
-          </a:effectLst>
-        </a:effectStyle>
-        <a:effectStyle>
-          <a:effectLst>
-            <a:outerShdw blurRad="40000" dist="23000" dir="5400000" rotWithShape="0">
-              <a:srgbClr val="000000">
-                <a:alpha val="35000"/>
-              </a:srgbClr>
-            </a:outerShdw>
-          </a:effectLst>
-        </a:effectStyle>
-        <a:effectStyle>
-          <a:effectLst>
-            <a:outerShdw blurRad="40000" dist="23000" dir="5400000" rotWithShape="0">
-              <a:srgbClr val="000000">
-                <a:alpha val="35000"/>
-              </a:srgbClr>
-            </a:outerShdw>
-          </a:effectLst>
-          <a:scene3d>
-            <a:camera prst="orthographicFront">
-              <a:rot lat="0" lon="0" rev="0"/>
-            </a:camera>
-            <a:lightRig rig="threePt" dir="t">
-              <a:rot lat="0" lon="0" rev="1200000"/>
-            </a:lightRig>
-          </a:scene3d>
-          <a:sp3d>
-            <a:bevelT w="63500" h="25400"/>
-          </a:sp3d>
-        </a:effectStyle>
-      </a:effectStyleLst>
-      <a:bgFillStyleLst>
-        <a:solidFill>
-          <a:schemeClr val="phClr"/>
-        </a:solidFill>
-        <a:gradFill rotWithShape="1">
-          <a:gsLst>
-            <a:gs pos="0">
-              <a:schemeClr val="phClr">
-                <a:tint val="40000"/>
-                <a:satMod val="350000"/>
-              </a:schemeClr>
-            </a:gs>
-            <a:gs pos="40000">
-              <a:schemeClr val="phClr">
-                <a:tint val="45000"/>
-                <a:shade val="99000"/>
-                <a:satMod val="350000"/>
-              </a:schemeClr>
-            </a:gs>
-            <a:gs pos="100000">
-              <a:schemeClr val="phClr">
-                <a:shade val="20000"/>
-                <a:satMod val="255000"/>
-              </a:schemeClr>
-            </a:gs>
-          </a:gsLst>
-          <a:path path="circle">
-            <a:fillToRect l="50000" t="-80000" r="50000" b="180000"/>
-          </a:path>
-        </a:gradFill>
-        <a:gradFill rotWithShape="1">
-          <a:gsLst>
-            <a:gs pos="0">
-              <a:schemeClr val="phClr">
-                <a:tint val="80000"/>
-                <a:satMod val="300000"/>
-              </a:schemeClr>
-            </a:gs>
-            <a:gs pos="100000">
-              <a:schemeClr val="phClr">
-                <a:shade val="30000"/>
-                <a:satMod val="200000"/>
-              </a:schemeClr>
-            </a:gs>
-          </a:gsLst>
-          <a:path path="circle">
-            <a:fillToRect l="50000" t="50000" r="50000" b="50000"/>
-          </a:path>
-        </a:gradFill>
-      </a:bgFillStyleLst>
-    </a:fmtScheme>
-  </a:themeElements>
-</a:theme>
 </file>
</xml_diff>